<commit_message>
Update The Decorator pattern.pptx
</commit_message>
<xml_diff>
--- a/Slides/The Decorator pattern.pptx
+++ b/Slides/The Decorator pattern.pptx
@@ -3428,15 +3428,7 @@
           <a:p>
             <a:r>
               <a:rPr lang="da-DK" dirty="0"/>
-              <a:t>Asger B. Breinholm, Mathias </a:t>
-            </a:r>
-            <a:r>
-              <a:rPr lang="da-DK" dirty="0" err="1"/>
-              <a:t>Brandgaard</a:t>
-            </a:r>
-            <a:r>
-              <a:rPr lang="da-DK" dirty="0"/>
-              <a:t> and Rob </a:t>
+              <a:t>Asger Breinholm, Mathias Brændgaard and Rob </a:t>
             </a:r>
             <a:r>
               <a:rPr lang="da-DK" dirty="0" err="1"/>

</xml_diff>